<commit_message>
the attraction of fear 0.8 working posters, but the class itself is unfinished
</commit_message>
<xml_diff>
--- a/Аттракцион страха/Аттракцион страха.pptx
+++ b/Аттракцион страха/Аттракцион страха.pptx
@@ -107,6 +107,11 @@
       </a:defRPr>
     </a:lvl9pPr>
   </p:defaultTextStyle>
+  <p:extLst>
+    <p:ext uri="{EFAFB233-063F-42B5-8137-9DF3F51BA10A}">
+      <p15:sldGuideLst xmlns:p15="http://schemas.microsoft.com/office/powerpoint/2012/main"/>
+    </p:ext>
+  </p:extLst>
 </p:presentation>
 </file>
 
@@ -280,7 +285,7 @@
           <a:p>
             <a:fld id="{48A87A34-81AB-432B-8DAE-1953F412C126}" type="datetimeFigureOut">
               <a:rPr lang="en-US" dirty="0"/>
-              <a:t>1/17/2022</a:t>
+              <a:t>1/24/2022</a:t>
             </a:fld>
             <a:endParaRPr lang="en-US" dirty="0"/>
           </a:p>
@@ -542,7 +547,7 @@
           <a:p>
             <a:fld id="{48A87A34-81AB-432B-8DAE-1953F412C126}" type="datetimeFigureOut">
               <a:rPr lang="en-US" dirty="0"/>
-              <a:t>1/17/2022</a:t>
+              <a:t>1/24/2022</a:t>
             </a:fld>
             <a:endParaRPr lang="en-US" dirty="0"/>
           </a:p>
@@ -769,7 +774,7 @@
             <a:fld id="{48A87A34-81AB-432B-8DAE-1953F412C126}" type="datetimeFigureOut">
               <a:rPr lang="en-US" dirty="0"/>
               <a:pPr/>
-              <a:t>1/17/2022</a:t>
+              <a:t>1/24/2022</a:t>
             </a:fld>
             <a:endParaRPr lang="en-US" dirty="0"/>
           </a:p>
@@ -1075,7 +1080,7 @@
             <a:fld id="{48A87A34-81AB-432B-8DAE-1953F412C126}" type="datetimeFigureOut">
               <a:rPr lang="en-US" dirty="0"/>
               <a:pPr/>
-              <a:t>1/17/2022</a:t>
+              <a:t>1/24/2022</a:t>
             </a:fld>
             <a:endParaRPr lang="en-US" dirty="0"/>
           </a:p>
@@ -1544,7 +1549,7 @@
             <a:fld id="{48A87A34-81AB-432B-8DAE-1953F412C126}" type="datetimeFigureOut">
               <a:rPr lang="en-US" dirty="0"/>
               <a:pPr/>
-              <a:t>1/17/2022</a:t>
+              <a:t>1/24/2022</a:t>
             </a:fld>
             <a:endParaRPr lang="en-US" dirty="0"/>
           </a:p>
@@ -2086,7 +2091,7 @@
           <a:p>
             <a:fld id="{48A87A34-81AB-432B-8DAE-1953F412C126}" type="datetimeFigureOut">
               <a:rPr lang="en-US" dirty="0"/>
-              <a:t>1/17/2022</a:t>
+              <a:t>1/24/2022</a:t>
             </a:fld>
             <a:endParaRPr lang="en-US" dirty="0"/>
           </a:p>
@@ -2855,7 +2860,7 @@
           <a:p>
             <a:fld id="{48A87A34-81AB-432B-8DAE-1953F412C126}" type="datetimeFigureOut">
               <a:rPr lang="en-US" dirty="0"/>
-              <a:t>1/17/2022</a:t>
+              <a:t>1/24/2022</a:t>
             </a:fld>
             <a:endParaRPr lang="en-US" dirty="0"/>
           </a:p>
@@ -3025,7 +3030,7 @@
           <a:p>
             <a:fld id="{48A87A34-81AB-432B-8DAE-1953F412C126}" type="datetimeFigureOut">
               <a:rPr lang="en-US" dirty="0"/>
-              <a:t>1/17/2022</a:t>
+              <a:t>1/24/2022</a:t>
             </a:fld>
             <a:endParaRPr lang="en-US" dirty="0"/>
           </a:p>
@@ -3244,7 +3249,7 @@
             <a:fld id="{48A87A34-81AB-432B-8DAE-1953F412C126}" type="datetimeFigureOut">
               <a:rPr lang="en-US" dirty="0"/>
               <a:pPr/>
-              <a:t>1/17/2022</a:t>
+              <a:t>1/24/2022</a:t>
             </a:fld>
             <a:endParaRPr lang="en-US" dirty="0"/>
           </a:p>
@@ -3419,7 +3424,7 @@
           <a:p>
             <a:fld id="{48A87A34-81AB-432B-8DAE-1953F412C126}" type="datetimeFigureOut">
               <a:rPr lang="en-US" dirty="0"/>
-              <a:t>1/17/2022</a:t>
+              <a:t>1/24/2022</a:t>
             </a:fld>
             <a:endParaRPr lang="en-US" dirty="0"/>
           </a:p>
@@ -3704,7 +3709,7 @@
             <a:fld id="{48A87A34-81AB-432B-8DAE-1953F412C126}" type="datetimeFigureOut">
               <a:rPr lang="en-US" dirty="0"/>
               <a:pPr/>
-              <a:t>1/17/2022</a:t>
+              <a:t>1/24/2022</a:t>
             </a:fld>
             <a:endParaRPr lang="en-US" dirty="0"/>
           </a:p>
@@ -3941,7 +3946,7 @@
           <a:p>
             <a:fld id="{48A87A34-81AB-432B-8DAE-1953F412C126}" type="datetimeFigureOut">
               <a:rPr lang="en-US" dirty="0"/>
-              <a:t>1/17/2022</a:t>
+              <a:t>1/24/2022</a:t>
             </a:fld>
             <a:endParaRPr lang="en-US" dirty="0"/>
           </a:p>
@@ -4315,7 +4320,7 @@
           <a:p>
             <a:fld id="{48A87A34-81AB-432B-8DAE-1953F412C126}" type="datetimeFigureOut">
               <a:rPr lang="en-US" dirty="0"/>
-              <a:t>1/17/2022</a:t>
+              <a:t>1/24/2022</a:t>
             </a:fld>
             <a:endParaRPr lang="en-US" dirty="0"/>
           </a:p>
@@ -4428,7 +4433,7 @@
           <a:p>
             <a:fld id="{48A87A34-81AB-432B-8DAE-1953F412C126}" type="datetimeFigureOut">
               <a:rPr lang="en-US" dirty="0"/>
-              <a:t>1/17/2022</a:t>
+              <a:t>1/24/2022</a:t>
             </a:fld>
             <a:endParaRPr lang="en-US" dirty="0"/>
           </a:p>
@@ -4518,7 +4523,7 @@
           <a:p>
             <a:fld id="{48A87A34-81AB-432B-8DAE-1953F412C126}" type="datetimeFigureOut">
               <a:rPr lang="en-US" dirty="0"/>
-              <a:t>1/17/2022</a:t>
+              <a:t>1/24/2022</a:t>
             </a:fld>
             <a:endParaRPr lang="en-US" dirty="0"/>
           </a:p>
@@ -4762,7 +4767,7 @@
           <a:p>
             <a:fld id="{48A87A34-81AB-432B-8DAE-1953F412C126}" type="datetimeFigureOut">
               <a:rPr lang="en-US" dirty="0"/>
-              <a:t>1/17/2022</a:t>
+              <a:t>1/24/2022</a:t>
             </a:fld>
             <a:endParaRPr lang="en-US" dirty="0"/>
           </a:p>
@@ -5014,7 +5019,7 @@
           <a:p>
             <a:fld id="{48A87A34-81AB-432B-8DAE-1953F412C126}" type="datetimeFigureOut">
               <a:rPr lang="en-US" dirty="0"/>
-              <a:t>1/17/2022</a:t>
+              <a:t>1/24/2022</a:t>
             </a:fld>
             <a:endParaRPr lang="en-US" dirty="0"/>
           </a:p>
@@ -5253,7 +5258,7 @@
             <a:fld id="{48A87A34-81AB-432B-8DAE-1953F412C126}" type="datetimeFigureOut">
               <a:rPr lang="en-US" dirty="0"/>
               <a:pPr/>
-              <a:t>1/17/2022</a:t>
+              <a:t>1/24/2022</a:t>
             </a:fld>
             <a:endParaRPr lang="en-US" dirty="0"/>
           </a:p>
@@ -6056,10 +6061,10 @@
       </p:pic>
       <p:pic>
         <p:nvPicPr>
-          <p:cNvPr id="7" name="Рисунок 6">
+          <p:cNvPr id="6" name="Рисунок 5">
             <a:extLst>
               <a:ext uri="{FF2B5EF4-FFF2-40B4-BE49-F238E27FC236}">
-                <a16:creationId xmlns:a16="http://schemas.microsoft.com/office/drawing/2014/main" id="{148D5590-83A4-433A-8E1F-16724BEEF99A}"/>
+                <a16:creationId xmlns:a16="http://schemas.microsoft.com/office/drawing/2014/main" id="{78E32677-7A3D-4144-8777-929FCB8A32BE}"/>
               </a:ext>
             </a:extLst>
           </p:cNvPr>
@@ -6076,8 +6081,8 @@
         </p:blipFill>
         <p:spPr>
           <a:xfrm>
-            <a:off x="6096000" y="3687205"/>
-            <a:ext cx="4746564" cy="2668639"/>
+            <a:off x="6340080" y="4206622"/>
+            <a:ext cx="4094922" cy="2302269"/>
           </a:xfrm>
           <a:prstGeom prst="rect">
             <a:avLst/>
@@ -6209,7 +6214,7 @@
             <a:pPr lvl="1"/>
             <a:r>
               <a:rPr lang="ru-RU" dirty="0"/>
-              <a:t>Доработка «постеров»</a:t>
+              <a:t>Доработка класса «постеров»</a:t>
             </a:r>
           </a:p>
           <a:p>

</xml_diff>

<commit_message>
the attraction of fear 0.9 The posters are fully functional
</commit_message>
<xml_diff>
--- a/Аттракцион страха/Аттракцион страха.pptx
+++ b/Аттракцион страха/Аттракцион страха.pptx
@@ -285,7 +285,7 @@
           <a:p>
             <a:fld id="{48A87A34-81AB-432B-8DAE-1953F412C126}" type="datetimeFigureOut">
               <a:rPr lang="en-US" dirty="0"/>
-              <a:t>1/24/2022</a:t>
+              <a:t>1/27/2022</a:t>
             </a:fld>
             <a:endParaRPr lang="en-US" dirty="0"/>
           </a:p>
@@ -547,7 +547,7 @@
           <a:p>
             <a:fld id="{48A87A34-81AB-432B-8DAE-1953F412C126}" type="datetimeFigureOut">
               <a:rPr lang="en-US" dirty="0"/>
-              <a:t>1/24/2022</a:t>
+              <a:t>1/27/2022</a:t>
             </a:fld>
             <a:endParaRPr lang="en-US" dirty="0"/>
           </a:p>
@@ -774,7 +774,7 @@
             <a:fld id="{48A87A34-81AB-432B-8DAE-1953F412C126}" type="datetimeFigureOut">
               <a:rPr lang="en-US" dirty="0"/>
               <a:pPr/>
-              <a:t>1/24/2022</a:t>
+              <a:t>1/27/2022</a:t>
             </a:fld>
             <a:endParaRPr lang="en-US" dirty="0"/>
           </a:p>
@@ -1080,7 +1080,7 @@
             <a:fld id="{48A87A34-81AB-432B-8DAE-1953F412C126}" type="datetimeFigureOut">
               <a:rPr lang="en-US" dirty="0"/>
               <a:pPr/>
-              <a:t>1/24/2022</a:t>
+              <a:t>1/27/2022</a:t>
             </a:fld>
             <a:endParaRPr lang="en-US" dirty="0"/>
           </a:p>
@@ -1549,7 +1549,7 @@
             <a:fld id="{48A87A34-81AB-432B-8DAE-1953F412C126}" type="datetimeFigureOut">
               <a:rPr lang="en-US" dirty="0"/>
               <a:pPr/>
-              <a:t>1/24/2022</a:t>
+              <a:t>1/27/2022</a:t>
             </a:fld>
             <a:endParaRPr lang="en-US" dirty="0"/>
           </a:p>
@@ -2091,7 +2091,7 @@
           <a:p>
             <a:fld id="{48A87A34-81AB-432B-8DAE-1953F412C126}" type="datetimeFigureOut">
               <a:rPr lang="en-US" dirty="0"/>
-              <a:t>1/24/2022</a:t>
+              <a:t>1/27/2022</a:t>
             </a:fld>
             <a:endParaRPr lang="en-US" dirty="0"/>
           </a:p>
@@ -2860,7 +2860,7 @@
           <a:p>
             <a:fld id="{48A87A34-81AB-432B-8DAE-1953F412C126}" type="datetimeFigureOut">
               <a:rPr lang="en-US" dirty="0"/>
-              <a:t>1/24/2022</a:t>
+              <a:t>1/27/2022</a:t>
             </a:fld>
             <a:endParaRPr lang="en-US" dirty="0"/>
           </a:p>
@@ -3030,7 +3030,7 @@
           <a:p>
             <a:fld id="{48A87A34-81AB-432B-8DAE-1953F412C126}" type="datetimeFigureOut">
               <a:rPr lang="en-US" dirty="0"/>
-              <a:t>1/24/2022</a:t>
+              <a:t>1/27/2022</a:t>
             </a:fld>
             <a:endParaRPr lang="en-US" dirty="0"/>
           </a:p>
@@ -3249,7 +3249,7 @@
             <a:fld id="{48A87A34-81AB-432B-8DAE-1953F412C126}" type="datetimeFigureOut">
               <a:rPr lang="en-US" dirty="0"/>
               <a:pPr/>
-              <a:t>1/24/2022</a:t>
+              <a:t>1/27/2022</a:t>
             </a:fld>
             <a:endParaRPr lang="en-US" dirty="0"/>
           </a:p>
@@ -3424,7 +3424,7 @@
           <a:p>
             <a:fld id="{48A87A34-81AB-432B-8DAE-1953F412C126}" type="datetimeFigureOut">
               <a:rPr lang="en-US" dirty="0"/>
-              <a:t>1/24/2022</a:t>
+              <a:t>1/27/2022</a:t>
             </a:fld>
             <a:endParaRPr lang="en-US" dirty="0"/>
           </a:p>
@@ -3709,7 +3709,7 @@
             <a:fld id="{48A87A34-81AB-432B-8DAE-1953F412C126}" type="datetimeFigureOut">
               <a:rPr lang="en-US" dirty="0"/>
               <a:pPr/>
-              <a:t>1/24/2022</a:t>
+              <a:t>1/27/2022</a:t>
             </a:fld>
             <a:endParaRPr lang="en-US" dirty="0"/>
           </a:p>
@@ -3946,7 +3946,7 @@
           <a:p>
             <a:fld id="{48A87A34-81AB-432B-8DAE-1953F412C126}" type="datetimeFigureOut">
               <a:rPr lang="en-US" dirty="0"/>
-              <a:t>1/24/2022</a:t>
+              <a:t>1/27/2022</a:t>
             </a:fld>
             <a:endParaRPr lang="en-US" dirty="0"/>
           </a:p>
@@ -4320,7 +4320,7 @@
           <a:p>
             <a:fld id="{48A87A34-81AB-432B-8DAE-1953F412C126}" type="datetimeFigureOut">
               <a:rPr lang="en-US" dirty="0"/>
-              <a:t>1/24/2022</a:t>
+              <a:t>1/27/2022</a:t>
             </a:fld>
             <a:endParaRPr lang="en-US" dirty="0"/>
           </a:p>
@@ -4433,7 +4433,7 @@
           <a:p>
             <a:fld id="{48A87A34-81AB-432B-8DAE-1953F412C126}" type="datetimeFigureOut">
               <a:rPr lang="en-US" dirty="0"/>
-              <a:t>1/24/2022</a:t>
+              <a:t>1/27/2022</a:t>
             </a:fld>
             <a:endParaRPr lang="en-US" dirty="0"/>
           </a:p>
@@ -4523,7 +4523,7 @@
           <a:p>
             <a:fld id="{48A87A34-81AB-432B-8DAE-1953F412C126}" type="datetimeFigureOut">
               <a:rPr lang="en-US" dirty="0"/>
-              <a:t>1/24/2022</a:t>
+              <a:t>1/27/2022</a:t>
             </a:fld>
             <a:endParaRPr lang="en-US" dirty="0"/>
           </a:p>
@@ -4767,7 +4767,7 @@
           <a:p>
             <a:fld id="{48A87A34-81AB-432B-8DAE-1953F412C126}" type="datetimeFigureOut">
               <a:rPr lang="en-US" dirty="0"/>
-              <a:t>1/24/2022</a:t>
+              <a:t>1/27/2022</a:t>
             </a:fld>
             <a:endParaRPr lang="en-US" dirty="0"/>
           </a:p>
@@ -5019,7 +5019,7 @@
           <a:p>
             <a:fld id="{48A87A34-81AB-432B-8DAE-1953F412C126}" type="datetimeFigureOut">
               <a:rPr lang="en-US" dirty="0"/>
-              <a:t>1/24/2022</a:t>
+              <a:t>1/27/2022</a:t>
             </a:fld>
             <a:endParaRPr lang="en-US" dirty="0"/>
           </a:p>
@@ -5258,7 +5258,7 @@
             <a:fld id="{48A87A34-81AB-432B-8DAE-1953F412C126}" type="datetimeFigureOut">
               <a:rPr lang="en-US" dirty="0"/>
               <a:pPr/>
-              <a:t>1/24/2022</a:t>
+              <a:t>1/27/2022</a:t>
             </a:fld>
             <a:endParaRPr lang="en-US" dirty="0"/>
           </a:p>
@@ -6024,7 +6024,7 @@
           <a:p>
             <a:r>
               <a:rPr lang="ru-RU" dirty="0"/>
-              <a:t>Так же в игру добавлены затемнения (чем дальше объект тем темнее он), попытка реализации «постеров». Эта игра раскроется полностью на любой экран без потери соотношения сторон. Так же в ней можно с  лёгкость создавать свои карты.</a:t>
+              <a:t>Так же в игру добавлены затемнения (чем дальше объект тем темнее он), реализованы «постеры». Эта игра раскроется полностью на любой экран без потери соотношения сторон. Так же в ней можно с  лёгкость создавать свои карты.</a:t>
             </a:r>
           </a:p>
         </p:txBody>
@@ -6208,13 +6208,6 @@
             <a:r>
               <a:rPr lang="ru-RU" dirty="0"/>
               <a:t>Просмотр камер</a:t>
-            </a:r>
-          </a:p>
-          <a:p>
-            <a:pPr lvl="1"/>
-            <a:r>
-              <a:rPr lang="ru-RU" dirty="0"/>
-              <a:t>Доработка класса «постеров»</a:t>
             </a:r>
           </a:p>
           <a:p>

</xml_diff>